<commit_message>
Updated process map template
</commit_message>
<xml_diff>
--- a/__tests__/fixtures/process-map-template.pptx
+++ b/__tests__/fixtures/process-map-template.pptx
@@ -4019,7 +4019,7 @@
                 </a:solidFill>
                 <a:latin typeface="+mn-lt"/>
               </a:rPr>
-              <a:t>Any use of this material without specific permission of McKinsey &amp; Company is strictly prohibited</a:t>
+              <a:t>Any use of this material without specific permission of &amp; Company is strictly prohibited</a:t>
             </a:r>
           </a:p>
         </p:txBody>
@@ -4196,7 +4196,7 @@
                 </a:solidFill>
                 <a:latin typeface="+mn-lt"/>
               </a:rPr>
-              <a:t>McKinsey &amp; Company</a:t>
+              <a:t> &amp; Company</a:t>
             </a:r>
           </a:p>
         </p:txBody>
@@ -4480,7 +4480,7 @@
                 </a:solidFill>
                 <a:latin typeface="+mn-lt"/>
               </a:rPr>
-              <a:t>McKinsey &amp; Company</a:t>
+              <a:t> &amp; Company</a:t>
             </a:r>
           </a:p>
         </p:txBody>
@@ -7987,7 +7987,7 @@
                 </a:solidFill>
                 <a:latin typeface="+mn-lt"/>
               </a:rPr>
-              <a:t>McKinsey &amp; Company</a:t>
+              <a:t> &amp; Company</a:t>
             </a:r>
           </a:p>
         </p:txBody>
@@ -8274,7 +8274,7 @@
                 </a:solidFill>
                 <a:latin typeface="+mn-lt"/>
               </a:rPr>
-              <a:t>McKinsey &amp; Company</a:t>
+              <a:t> &amp; Company</a:t>
             </a:r>
           </a:p>
         </p:txBody>
@@ -27566,7 +27566,7 @@
   </a:objectDefaults>
   <a:extraClrSchemeLst>
     <a:extraClrScheme>
-      <a:clrScheme name="McKinsey Grey-Blue">
+      <a:clrScheme name=" Grey-Blue">
         <a:dk1>
           <a:srgbClr val="000000"/>
         </a:dk1>
@@ -27607,7 +27607,7 @@
       <a:clrMap bg1="lt1" tx1="dk1" bg2="lt2" tx2="dk2" accent1="accent1" accent2="accent2" accent3="accent3" accent4="accent4" accent5="accent5" accent6="accent6" hlink="hlink" folHlink="folHlink"/>
     </a:extraClrScheme>
     <a:extraClrScheme>
-      <a:clrScheme name="McKinsey Cyan-Blue">
+      <a:clrScheme name=" Cyan-Blue">
         <a:dk1>
           <a:srgbClr val="000000"/>
         </a:dk1>
@@ -27659,7 +27659,7 @@
 <file path=ppt/theme/theme2.xml><?xml version="1.0" encoding="utf-8"?>
 <a:theme xmlns:a="http://schemas.openxmlformats.org/drawingml/2006/main" name="Firm Format - template_Grey">
   <a:themeElements>
-    <a:clrScheme name="McKinsey Blue with Pink">
+    <a:clrScheme name=" Blue with Pink">
       <a:dk1>
         <a:srgbClr val="000000"/>
       </a:dk1>
@@ -27943,7 +27943,7 @@
   </a:objectDefaults>
   <a:extraClrSchemeLst>
     <a:extraClrScheme>
-      <a:clrScheme name="McKinsey Blue with Orange">
+      <a:clrScheme name=" Blue with Orange">
         <a:dk1>
           <a:srgbClr val="000000"/>
         </a:dk1>
@@ -27984,7 +27984,7 @@
       <a:clrMap bg1="lt1" tx1="dk1" bg2="lt2" tx2="dk2" accent1="accent1" accent2="accent2" accent3="accent3" accent4="accent4" accent5="accent5" accent6="accent6" hlink="hlink" folHlink="folHlink"/>
     </a:extraClrScheme>
     <a:extraClrScheme>
-      <a:clrScheme name="McKinsey Blue with Pink">
+      <a:clrScheme name=" Blue with Pink">
         <a:dk1>
           <a:srgbClr val="000000"/>
         </a:dk1>

</xml_diff>